<commit_message>
forgot to save L7.4
</commit_message>
<xml_diff>
--- a/Slides/Lesson 7.4 Case Study-- Undefined Variables.pptx
+++ b/Slides/Lesson 7.4 Case Study-- Undefined Variables.pptx
@@ -14311,22 +14311,26 @@
           <a:lstStyle/>
           <a:p>
             <a:r>
+              <a:rPr lang="en-US" dirty="0"/>
+              <a:t>Study Examples/07-3-gartersnake.rkt</a:t>
+            </a:r>
+          </a:p>
+          <a:p>
+            <a:r>
+              <a:rPr lang="en-US" dirty="0"/>
+              <a:t>If you have questions about this lesson, ask them on the Discussion Board</a:t>
+            </a:r>
+          </a:p>
+          <a:p>
+            <a:r>
+              <a:rPr lang="en-US" dirty="0"/>
+              <a:t>Do </a:t>
+            </a:r>
+            <a:r>
               <a:rPr lang="en-US"/>
-              <a:t>Study Examples/07-3-gartersnake.rkt</a:t>
+              <a:t>Guided Practices 7.2 and 7.3</a:t>
             </a:r>
             <a:endParaRPr lang="en-US" dirty="0"/>
-          </a:p>
-          <a:p>
-            <a:r>
-              <a:rPr lang="en-US" dirty="0"/>
-              <a:t>If you have questions about this lesson, ask them on the Discussion Board</a:t>
-            </a:r>
-          </a:p>
-          <a:p>
-            <a:r>
-              <a:rPr lang="en-US" dirty="0"/>
-              <a:t>Do Guided Practice 7.3</a:t>
-            </a:r>
           </a:p>
           <a:p>
             <a:r>

</xml_diff>